<commit_message>
Slight change to powerpoint, and updated scores for model run
</commit_message>
<xml_diff>
--- a/Meeting Presentations/01.12.2022_General meeting.pptx
+++ b/Meeting Presentations/01.12.2022_General meeting.pptx
@@ -7,15 +7,14 @@
   <p:sldIdLst>
     <p:sldId id="256" r:id="rId2"/>
     <p:sldId id="258" r:id="rId3"/>
-    <p:sldId id="257" r:id="rId4"/>
-    <p:sldId id="259" r:id="rId5"/>
-    <p:sldId id="261" r:id="rId6"/>
-    <p:sldId id="262" r:id="rId7"/>
-    <p:sldId id="263" r:id="rId8"/>
-    <p:sldId id="265" r:id="rId9"/>
-    <p:sldId id="260" r:id="rId10"/>
-    <p:sldId id="264" r:id="rId11"/>
-    <p:sldId id="266" r:id="rId12"/>
+    <p:sldId id="259" r:id="rId4"/>
+    <p:sldId id="261" r:id="rId5"/>
+    <p:sldId id="262" r:id="rId6"/>
+    <p:sldId id="263" r:id="rId7"/>
+    <p:sldId id="265" r:id="rId8"/>
+    <p:sldId id="260" r:id="rId9"/>
+    <p:sldId id="264" r:id="rId10"/>
+    <p:sldId id="266" r:id="rId11"/>
   </p:sldIdLst>
   <p:sldSz cx="12192000" cy="6858000"/>
   <p:notesSz cx="6858000" cy="9144000"/>
@@ -114,6 +113,11 @@
       </a:defRPr>
     </a:lvl9pPr>
   </p:defaultTextStyle>
+  <p:extLst>
+    <p:ext uri="{EFAFB233-063F-42B5-8137-9DF3F51BA10A}">
+      <p15:sldGuideLst xmlns:p15="http://schemas.microsoft.com/office/powerpoint/2012/main"/>
+    </p:ext>
+  </p:extLst>
 </p:presentation>
 </file>
 
@@ -250,7 +254,7 @@
           <a:p>
             <a:fld id="{75AEC91D-98DE-480B-8969-E590907223DA}" type="datetimeFigureOut">
               <a:rPr lang="en-GB" smtClean="0"/>
-              <a:t>30/11/2022</a:t>
+              <a:t>01/12/2022</a:t>
             </a:fld>
             <a:endParaRPr lang="en-GB"/>
           </a:p>
@@ -537,7 +541,7 @@
           <a:p>
             <a:fld id="{75AEC91D-98DE-480B-8969-E590907223DA}" type="datetimeFigureOut">
               <a:rPr lang="en-GB" smtClean="0"/>
-              <a:t>30/11/2022</a:t>
+              <a:t>01/12/2022</a:t>
             </a:fld>
             <a:endParaRPr lang="en-GB"/>
           </a:p>
@@ -729,7 +733,7 @@
           <a:p>
             <a:fld id="{75AEC91D-98DE-480B-8969-E590907223DA}" type="datetimeFigureOut">
               <a:rPr lang="en-GB" smtClean="0"/>
-              <a:t>30/11/2022</a:t>
+              <a:t>01/12/2022</a:t>
             </a:fld>
             <a:endParaRPr lang="en-GB"/>
           </a:p>
@@ -990,7 +994,7 @@
           <a:p>
             <a:fld id="{75AEC91D-98DE-480B-8969-E590907223DA}" type="datetimeFigureOut">
               <a:rPr lang="en-GB" smtClean="0"/>
-              <a:t>30/11/2022</a:t>
+              <a:t>01/12/2022</a:t>
             </a:fld>
             <a:endParaRPr lang="en-GB"/>
           </a:p>
@@ -1414,7 +1418,7 @@
           <a:p>
             <a:fld id="{75AEC91D-98DE-480B-8969-E590907223DA}" type="datetimeFigureOut">
               <a:rPr lang="en-GB" smtClean="0"/>
-              <a:t>30/11/2022</a:t>
+              <a:t>01/12/2022</a:t>
             </a:fld>
             <a:endParaRPr lang="en-GB"/>
           </a:p>
@@ -1960,7 +1964,7 @@
           <a:p>
             <a:fld id="{75AEC91D-98DE-480B-8969-E590907223DA}" type="datetimeFigureOut">
               <a:rPr lang="en-GB" smtClean="0"/>
-              <a:t>30/11/2022</a:t>
+              <a:t>01/12/2022</a:t>
             </a:fld>
             <a:endParaRPr lang="en-GB"/>
           </a:p>
@@ -2800,7 +2804,7 @@
           <a:p>
             <a:fld id="{75AEC91D-98DE-480B-8969-E590907223DA}" type="datetimeFigureOut">
               <a:rPr lang="en-GB" smtClean="0"/>
-              <a:t>30/11/2022</a:t>
+              <a:t>01/12/2022</a:t>
             </a:fld>
             <a:endParaRPr lang="en-GB"/>
           </a:p>
@@ -2970,7 +2974,7 @@
           <a:p>
             <a:fld id="{75AEC91D-98DE-480B-8969-E590907223DA}" type="datetimeFigureOut">
               <a:rPr lang="en-GB" smtClean="0"/>
-              <a:t>30/11/2022</a:t>
+              <a:t>01/12/2022</a:t>
             </a:fld>
             <a:endParaRPr lang="en-GB"/>
           </a:p>
@@ -3154,7 +3158,7 @@
           <a:p>
             <a:fld id="{75AEC91D-98DE-480B-8969-E590907223DA}" type="datetimeFigureOut">
               <a:rPr lang="en-GB" smtClean="0"/>
-              <a:t>30/11/2022</a:t>
+              <a:t>01/12/2022</a:t>
             </a:fld>
             <a:endParaRPr lang="en-GB"/>
           </a:p>
@@ -3324,7 +3328,7 @@
           <a:p>
             <a:fld id="{75AEC91D-98DE-480B-8969-E590907223DA}" type="datetimeFigureOut">
               <a:rPr lang="en-GB" smtClean="0"/>
-              <a:t>30/11/2022</a:t>
+              <a:t>01/12/2022</a:t>
             </a:fld>
             <a:endParaRPr lang="en-GB"/>
           </a:p>
@@ -3572,7 +3576,7 @@
           <a:p>
             <a:fld id="{75AEC91D-98DE-480B-8969-E590907223DA}" type="datetimeFigureOut">
               <a:rPr lang="en-GB" smtClean="0"/>
-              <a:t>30/11/2022</a:t>
+              <a:t>01/12/2022</a:t>
             </a:fld>
             <a:endParaRPr lang="en-GB"/>
           </a:p>
@@ -3809,7 +3813,7 @@
           <a:p>
             <a:fld id="{75AEC91D-98DE-480B-8969-E590907223DA}" type="datetimeFigureOut">
               <a:rPr lang="en-GB" smtClean="0"/>
-              <a:t>30/11/2022</a:t>
+              <a:t>01/12/2022</a:t>
             </a:fld>
             <a:endParaRPr lang="en-GB"/>
           </a:p>
@@ -4182,7 +4186,7 @@
           <a:p>
             <a:fld id="{75AEC91D-98DE-480B-8969-E590907223DA}" type="datetimeFigureOut">
               <a:rPr lang="en-GB" smtClean="0"/>
-              <a:t>30/11/2022</a:t>
+              <a:t>01/12/2022</a:t>
             </a:fld>
             <a:endParaRPr lang="en-GB"/>
           </a:p>
@@ -4300,7 +4304,7 @@
           <a:p>
             <a:fld id="{75AEC91D-98DE-480B-8969-E590907223DA}" type="datetimeFigureOut">
               <a:rPr lang="en-GB" smtClean="0"/>
-              <a:t>30/11/2022</a:t>
+              <a:t>01/12/2022</a:t>
             </a:fld>
             <a:endParaRPr lang="en-GB"/>
           </a:p>
@@ -4395,7 +4399,7 @@
           <a:p>
             <a:fld id="{75AEC91D-98DE-480B-8969-E590907223DA}" type="datetimeFigureOut">
               <a:rPr lang="en-GB" smtClean="0"/>
-              <a:t>30/11/2022</a:t>
+              <a:t>01/12/2022</a:t>
             </a:fld>
             <a:endParaRPr lang="en-GB"/>
           </a:p>
@@ -4646,7 +4650,7 @@
           <a:p>
             <a:fld id="{75AEC91D-98DE-480B-8969-E590907223DA}" type="datetimeFigureOut">
               <a:rPr lang="en-GB" smtClean="0"/>
-              <a:t>30/11/2022</a:t>
+              <a:t>01/12/2022</a:t>
             </a:fld>
             <a:endParaRPr lang="en-GB"/>
           </a:p>
@@ -4933,7 +4937,7 @@
           <a:p>
             <a:fld id="{75AEC91D-98DE-480B-8969-E590907223DA}" type="datetimeFigureOut">
               <a:rPr lang="en-GB" smtClean="0"/>
-              <a:t>30/11/2022</a:t>
+              <a:t>01/12/2022</a:t>
             </a:fld>
             <a:endParaRPr lang="en-GB"/>
           </a:p>
@@ -5146,7 +5150,7 @@
           <a:p>
             <a:fld id="{75AEC91D-98DE-480B-8969-E590907223DA}" type="datetimeFigureOut">
               <a:rPr lang="en-GB" smtClean="0"/>
-              <a:t>30/11/2022</a:t>
+              <a:t>01/12/2022</a:t>
             </a:fld>
             <a:endParaRPr lang="en-GB"/>
           </a:p>
@@ -5721,428 +5725,6 @@
       </p:grpSpPr>
       <p:sp>
         <p:nvSpPr>
-          <p:cNvPr id="2" name="Title 1">
-            <a:extLst>
-              <a:ext uri="{FF2B5EF4-FFF2-40B4-BE49-F238E27FC236}">
-                <a16:creationId xmlns:a16="http://schemas.microsoft.com/office/drawing/2014/main" id="{BDC5ACED-AADE-48D7-AD49-723E07D92B6D}"/>
-              </a:ext>
-            </a:extLst>
-          </p:cNvPr>
-          <p:cNvSpPr>
-            <a:spLocks noGrp="1"/>
-          </p:cNvSpPr>
-          <p:nvPr>
-            <p:ph type="title"/>
-          </p:nvPr>
-        </p:nvSpPr>
-        <p:spPr/>
-        <p:txBody>
-          <a:bodyPr/>
-          <a:lstStyle/>
-          <a:p>
-            <a:r>
-              <a:rPr lang="nb-NO" dirty="0" err="1"/>
-              <a:t>Updated</a:t>
-            </a:r>
-            <a:r>
-              <a:rPr lang="nb-NO" dirty="0"/>
-              <a:t> Goals</a:t>
-            </a:r>
-            <a:endParaRPr lang="en-GB" dirty="0"/>
-          </a:p>
-        </p:txBody>
-      </p:sp>
-      <p:sp>
-        <p:nvSpPr>
-          <p:cNvPr id="3" name="Content Placeholder 2">
-            <a:extLst>
-              <a:ext uri="{FF2B5EF4-FFF2-40B4-BE49-F238E27FC236}">
-                <a16:creationId xmlns:a16="http://schemas.microsoft.com/office/drawing/2014/main" id="{DC5C0603-7892-4960-BE27-F8C9F40E8AD2}"/>
-              </a:ext>
-            </a:extLst>
-          </p:cNvPr>
-          <p:cNvSpPr>
-            <a:spLocks noGrp="1"/>
-          </p:cNvSpPr>
-          <p:nvPr>
-            <p:ph idx="1"/>
-          </p:nvPr>
-        </p:nvSpPr>
-        <p:spPr/>
-        <p:txBody>
-          <a:bodyPr>
-            <a:normAutofit fontScale="85000" lnSpcReduction="20000"/>
-          </a:bodyPr>
-          <a:lstStyle/>
-          <a:p>
-            <a:r>
-              <a:rPr lang="nb-NO" dirty="0" err="1"/>
-              <a:t>Compare</a:t>
-            </a:r>
-            <a:r>
-              <a:rPr lang="nb-NO" dirty="0"/>
-              <a:t> </a:t>
-            </a:r>
-            <a:r>
-              <a:rPr lang="nb-NO" dirty="0" err="1"/>
-              <a:t>prediction</a:t>
-            </a:r>
-            <a:r>
-              <a:rPr lang="nb-NO" dirty="0"/>
-              <a:t> </a:t>
-            </a:r>
-            <a:r>
-              <a:rPr lang="nb-NO" dirty="0" err="1"/>
-              <a:t>results</a:t>
-            </a:r>
-            <a:r>
-              <a:rPr lang="nb-NO" dirty="0"/>
-              <a:t> </a:t>
-            </a:r>
-            <a:r>
-              <a:rPr lang="nb-NO" dirty="0" err="1"/>
-              <a:t>of</a:t>
-            </a:r>
-            <a:r>
-              <a:rPr lang="nb-NO" dirty="0"/>
-              <a:t> </a:t>
-            </a:r>
-            <a:r>
-              <a:rPr lang="nb-NO" dirty="0" err="1"/>
-              <a:t>following</a:t>
-            </a:r>
-            <a:r>
-              <a:rPr lang="nb-NO" dirty="0"/>
-              <a:t> </a:t>
-            </a:r>
-            <a:r>
-              <a:rPr lang="nb-NO" dirty="0" err="1"/>
-              <a:t>approaches</a:t>
-            </a:r>
-            <a:r>
-              <a:rPr lang="nb-NO" dirty="0"/>
-              <a:t>, all </a:t>
-            </a:r>
-            <a:r>
-              <a:rPr lang="nb-NO" dirty="0" err="1"/>
-              <a:t>predicting</a:t>
-            </a:r>
-            <a:r>
-              <a:rPr lang="nb-NO" dirty="0"/>
-              <a:t> CPT </a:t>
-            </a:r>
-            <a:r>
-              <a:rPr lang="nb-NO" dirty="0" err="1"/>
-              <a:t>also</a:t>
-            </a:r>
-            <a:r>
-              <a:rPr lang="nb-NO" dirty="0"/>
-              <a:t>:</a:t>
-            </a:r>
-          </a:p>
-          <a:p>
-            <a:pPr lvl="1"/>
-            <a:r>
-              <a:rPr lang="nb-NO" dirty="0"/>
-              <a:t>1D TCN </a:t>
-            </a:r>
-            <a:r>
-              <a:rPr lang="nb-NO" dirty="0" err="1"/>
-              <a:t>with</a:t>
-            </a:r>
-            <a:r>
-              <a:rPr lang="nb-NO" dirty="0"/>
-              <a:t> </a:t>
-            </a:r>
-            <a:r>
-              <a:rPr lang="nb-NO" dirty="0" err="1"/>
-              <a:t>regression</a:t>
-            </a:r>
-            <a:r>
-              <a:rPr lang="nb-NO" dirty="0"/>
-              <a:t> &amp; </a:t>
-            </a:r>
-            <a:r>
-              <a:rPr lang="nb-NO" dirty="0" err="1"/>
-              <a:t>reconstruction</a:t>
-            </a:r>
-            <a:endParaRPr lang="nb-NO" dirty="0"/>
-          </a:p>
-          <a:p>
-            <a:pPr lvl="1"/>
-            <a:r>
-              <a:rPr lang="nb-NO" dirty="0"/>
-              <a:t>1D TCN </a:t>
-            </a:r>
-            <a:r>
-              <a:rPr lang="nb-NO" dirty="0" err="1"/>
-              <a:t>with</a:t>
-            </a:r>
-            <a:r>
-              <a:rPr lang="nb-NO" dirty="0"/>
-              <a:t> </a:t>
-            </a:r>
-            <a:r>
-              <a:rPr lang="nb-NO" dirty="0" err="1"/>
-              <a:t>regression</a:t>
-            </a:r>
-            <a:r>
-              <a:rPr lang="nb-NO" dirty="0"/>
-              <a:t> &amp; </a:t>
-            </a:r>
-            <a:r>
-              <a:rPr lang="nb-NO" dirty="0" err="1"/>
-              <a:t>reconstruciton</a:t>
-            </a:r>
-            <a:r>
-              <a:rPr lang="nb-NO" dirty="0"/>
-              <a:t> </a:t>
-            </a:r>
-            <a:r>
-              <a:rPr lang="nb-NO" dirty="0" err="1"/>
-              <a:t>using</a:t>
-            </a:r>
-            <a:r>
-              <a:rPr lang="nb-NO" dirty="0"/>
-              <a:t> spatial info from </a:t>
-            </a:r>
-            <a:r>
-              <a:rPr lang="nb-NO" dirty="0" err="1"/>
-              <a:t>seismic</a:t>
-            </a:r>
-            <a:r>
-              <a:rPr lang="nb-NO" dirty="0"/>
-              <a:t> </a:t>
-            </a:r>
-            <a:r>
-              <a:rPr lang="nb-NO" dirty="0" err="1"/>
-              <a:t>attributes</a:t>
-            </a:r>
-            <a:endParaRPr lang="nb-NO" dirty="0"/>
-          </a:p>
-          <a:p>
-            <a:pPr lvl="1"/>
-            <a:r>
-              <a:rPr lang="nb-NO" dirty="0"/>
-              <a:t>2D TCN </a:t>
-            </a:r>
-            <a:r>
-              <a:rPr lang="nb-NO" dirty="0" err="1"/>
-              <a:t>with</a:t>
-            </a:r>
-            <a:r>
-              <a:rPr lang="nb-NO" dirty="0"/>
-              <a:t> </a:t>
-            </a:r>
-            <a:r>
-              <a:rPr lang="nb-NO" dirty="0" err="1"/>
-              <a:t>regression</a:t>
-            </a:r>
-            <a:r>
-              <a:rPr lang="nb-NO" dirty="0"/>
-              <a:t> &amp; </a:t>
-            </a:r>
-            <a:r>
-              <a:rPr lang="nb-NO" dirty="0" err="1"/>
-              <a:t>reconstruction</a:t>
-            </a:r>
-            <a:endParaRPr lang="nb-NO" dirty="0"/>
-          </a:p>
-          <a:p>
-            <a:pPr lvl="1"/>
-            <a:r>
-              <a:rPr lang="nb-NO" i="1" dirty="0">
-                <a:solidFill>
-                  <a:schemeClr val="tx1">
-                    <a:lumMod val="85000"/>
-                  </a:schemeClr>
-                </a:solidFill>
-              </a:rPr>
-              <a:t>1D TCN </a:t>
-            </a:r>
-            <a:r>
-              <a:rPr lang="nb-NO" i="1" dirty="0" err="1">
-                <a:solidFill>
-                  <a:schemeClr val="tx1">
-                    <a:lumMod val="85000"/>
-                  </a:schemeClr>
-                </a:solidFill>
-              </a:rPr>
-              <a:t>with</a:t>
-            </a:r>
-            <a:r>
-              <a:rPr lang="nb-NO" i="1" dirty="0">
-                <a:solidFill>
-                  <a:schemeClr val="tx1">
-                    <a:lumMod val="85000"/>
-                  </a:schemeClr>
-                </a:solidFill>
-              </a:rPr>
-              <a:t> Robertson </a:t>
-            </a:r>
-            <a:r>
-              <a:rPr lang="nb-NO" i="1" dirty="0" err="1">
-                <a:solidFill>
-                  <a:schemeClr val="tx1">
-                    <a:lumMod val="85000"/>
-                  </a:schemeClr>
-                </a:solidFill>
-              </a:rPr>
-              <a:t>classifyer</a:t>
-            </a:r>
-            <a:endParaRPr lang="nb-NO" i="1" dirty="0">
-              <a:solidFill>
-                <a:schemeClr val="tx1">
-                  <a:lumMod val="85000"/>
-                </a:schemeClr>
-              </a:solidFill>
-            </a:endParaRPr>
-          </a:p>
-          <a:p>
-            <a:pPr lvl="1"/>
-            <a:r>
-              <a:rPr lang="nb-NO" i="1" dirty="0">
-                <a:solidFill>
-                  <a:schemeClr val="tx1">
-                    <a:lumMod val="85000"/>
-                  </a:schemeClr>
-                </a:solidFill>
-              </a:rPr>
-              <a:t>2D TCN </a:t>
-            </a:r>
-            <a:r>
-              <a:rPr lang="nb-NO" i="1" dirty="0" err="1">
-                <a:solidFill>
-                  <a:schemeClr val="tx1">
-                    <a:lumMod val="85000"/>
-                  </a:schemeClr>
-                </a:solidFill>
-              </a:rPr>
-              <a:t>with</a:t>
-            </a:r>
-            <a:r>
-              <a:rPr lang="nb-NO" i="1" dirty="0">
-                <a:solidFill>
-                  <a:schemeClr val="tx1">
-                    <a:lumMod val="85000"/>
-                  </a:schemeClr>
-                </a:solidFill>
-              </a:rPr>
-              <a:t> Robertson </a:t>
-            </a:r>
-            <a:r>
-              <a:rPr lang="nb-NO" i="1" dirty="0" err="1">
-                <a:solidFill>
-                  <a:schemeClr val="tx1">
-                    <a:lumMod val="85000"/>
-                  </a:schemeClr>
-                </a:solidFill>
-              </a:rPr>
-              <a:t>classifyer</a:t>
-            </a:r>
-            <a:endParaRPr lang="nb-NO" i="1" dirty="0">
-              <a:solidFill>
-                <a:schemeClr val="tx1">
-                  <a:lumMod val="85000"/>
-                </a:schemeClr>
-              </a:solidFill>
-            </a:endParaRPr>
-          </a:p>
-          <a:p>
-            <a:r>
-              <a:rPr lang="nb-NO" dirty="0" err="1"/>
-              <a:t>Comparisons</a:t>
-            </a:r>
-            <a:r>
-              <a:rPr lang="nb-NO" dirty="0"/>
-              <a:t> </a:t>
-            </a:r>
-            <a:r>
-              <a:rPr lang="nb-NO" dirty="0" err="1"/>
-              <a:t>will</a:t>
-            </a:r>
-            <a:r>
-              <a:rPr lang="nb-NO" dirty="0"/>
-              <a:t> be done </a:t>
-            </a:r>
-            <a:r>
-              <a:rPr lang="nb-NO" dirty="0" err="1"/>
-              <a:t>based</a:t>
-            </a:r>
-            <a:r>
-              <a:rPr lang="nb-NO" dirty="0"/>
-              <a:t> </a:t>
-            </a:r>
-            <a:r>
-              <a:rPr lang="nb-NO" dirty="0" err="1"/>
-              <a:t>on</a:t>
-            </a:r>
-            <a:r>
-              <a:rPr lang="nb-NO" dirty="0"/>
-              <a:t>:</a:t>
-            </a:r>
-          </a:p>
-          <a:p>
-            <a:pPr lvl="1"/>
-            <a:r>
-              <a:rPr lang="en-GB" dirty="0"/>
-              <a:t>Model performance accuracy and loss</a:t>
-            </a:r>
-          </a:p>
-          <a:p>
-            <a:pPr lvl="1"/>
-            <a:r>
-              <a:rPr lang="en-GB" dirty="0"/>
-              <a:t>Ability to capture spatial features</a:t>
-            </a:r>
-          </a:p>
-          <a:p>
-            <a:pPr lvl="1"/>
-            <a:r>
-              <a:rPr lang="en-GB" dirty="0"/>
-              <a:t>Quality of predictions within certain features</a:t>
-            </a:r>
-          </a:p>
-          <a:p>
-            <a:r>
-              <a:rPr lang="en-GB" strike="sngStrike" dirty="0"/>
-              <a:t>Do in between seismic lines geostatistical predictions</a:t>
-            </a:r>
-          </a:p>
-        </p:txBody>
-      </p:sp>
-    </p:spTree>
-    <p:extLst>
-      <p:ext uri="{BB962C8B-B14F-4D97-AF65-F5344CB8AC3E}">
-        <p14:creationId xmlns:p14="http://schemas.microsoft.com/office/powerpoint/2010/main" val="1676976002"/>
-      </p:ext>
-    </p:extLst>
-  </p:cSld>
-  <p:clrMapOvr>
-    <a:masterClrMapping/>
-  </p:clrMapOvr>
-</p:sld>
-</file>
-
-<file path=ppt/slides/slide11.xml><?xml version="1.0" encoding="utf-8"?>
-<p:sld xmlns:a="http://schemas.openxmlformats.org/drawingml/2006/main" xmlns:r="http://schemas.openxmlformats.org/officeDocument/2006/relationships" xmlns:p="http://schemas.openxmlformats.org/presentationml/2006/main">
-  <p:cSld>
-    <p:spTree>
-      <p:nvGrpSpPr>
-        <p:cNvPr id="1" name=""/>
-        <p:cNvGrpSpPr/>
-        <p:nvPr/>
-      </p:nvGrpSpPr>
-      <p:grpSpPr>
-        <a:xfrm>
-          <a:off x="0" y="0"/>
-          <a:ext cx="0" cy="0"/>
-          <a:chOff x="0" y="0"/>
-          <a:chExt cx="0" cy="0"/>
-        </a:xfrm>
-      </p:grpSpPr>
-      <p:sp>
-        <p:nvSpPr>
           <p:cNvPr id="5" name="Title 4">
             <a:extLst>
               <a:ext uri="{FF2B5EF4-FFF2-40B4-BE49-F238E27FC236}">
@@ -6178,8 +5760,8 @@
           </a:p>
         </p:txBody>
       </p:sp>
-      <mc:AlternateContent xmlns:mc="http://schemas.openxmlformats.org/markup-compatibility/2006">
-        <mc:Choice xmlns:a14="http://schemas.microsoft.com/office/drawing/2010/main" Requires="a14">
+      <mc:AlternateContent xmlns:mc="http://schemas.openxmlformats.org/markup-compatibility/2006" xmlns:a14="http://schemas.microsoft.com/office/drawing/2010/main">
+        <mc:Choice Requires="a14">
           <p:sp>
             <p:nvSpPr>
               <p:cNvPr id="3" name="Content Placeholder 2">
@@ -6293,7 +5875,7 @@
             </p:txBody>
           </p:sp>
         </mc:Choice>
-        <mc:Fallback>
+        <mc:Fallback xmlns="">
           <p:sp>
             <p:nvSpPr>
               <p:cNvPr id="3" name="Content Placeholder 2">
@@ -6604,183 +6186,6 @@
           <p:cNvPr id="2" name="Title 1">
             <a:extLst>
               <a:ext uri="{FF2B5EF4-FFF2-40B4-BE49-F238E27FC236}">
-                <a16:creationId xmlns:a16="http://schemas.microsoft.com/office/drawing/2014/main" id="{711FC0A9-687C-41BF-8510-D4806A3D17B5}"/>
-              </a:ext>
-            </a:extLst>
-          </p:cNvPr>
-          <p:cNvSpPr>
-            <a:spLocks noGrp="1"/>
-          </p:cNvSpPr>
-          <p:nvPr>
-            <p:ph type="title"/>
-          </p:nvPr>
-        </p:nvSpPr>
-        <p:spPr/>
-        <p:txBody>
-          <a:bodyPr/>
-          <a:lstStyle/>
-          <a:p>
-            <a:r>
-              <a:rPr lang="nb-NO" dirty="0"/>
-              <a:t>Contents</a:t>
-            </a:r>
-            <a:endParaRPr lang="en-GB" dirty="0"/>
-          </a:p>
-        </p:txBody>
-      </p:sp>
-      <p:sp>
-        <p:nvSpPr>
-          <p:cNvPr id="3" name="Content Placeholder 2">
-            <a:extLst>
-              <a:ext uri="{FF2B5EF4-FFF2-40B4-BE49-F238E27FC236}">
-                <a16:creationId xmlns:a16="http://schemas.microsoft.com/office/drawing/2014/main" id="{595B4A5D-C418-462A-B15D-0543EE6D2C5B}"/>
-              </a:ext>
-            </a:extLst>
-          </p:cNvPr>
-          <p:cNvSpPr>
-            <a:spLocks noGrp="1"/>
-          </p:cNvSpPr>
-          <p:nvPr>
-            <p:ph idx="1"/>
-          </p:nvPr>
-        </p:nvSpPr>
-        <p:spPr/>
-        <p:txBody>
-          <a:bodyPr/>
-          <a:lstStyle/>
-          <a:p>
-            <a:r>
-              <a:rPr lang="nb-NO" dirty="0" err="1"/>
-              <a:t>Recap</a:t>
-            </a:r>
-            <a:r>
-              <a:rPr lang="nb-NO" dirty="0"/>
-              <a:t> </a:t>
-            </a:r>
-            <a:r>
-              <a:rPr lang="nb-NO" dirty="0" err="1"/>
-              <a:t>what</a:t>
-            </a:r>
-            <a:r>
-              <a:rPr lang="nb-NO" dirty="0"/>
-              <a:t> has </a:t>
-            </a:r>
-            <a:r>
-              <a:rPr lang="nb-NO" dirty="0" err="1"/>
-              <a:t>been</a:t>
-            </a:r>
-            <a:r>
-              <a:rPr lang="nb-NO" dirty="0"/>
-              <a:t> done </a:t>
-            </a:r>
-            <a:r>
-              <a:rPr lang="nb-NO" dirty="0" err="1"/>
-              <a:t>this</a:t>
-            </a:r>
-            <a:r>
-              <a:rPr lang="nb-NO" dirty="0"/>
-              <a:t> semester</a:t>
-            </a:r>
-          </a:p>
-          <a:p>
-            <a:r>
-              <a:rPr lang="nb-NO" dirty="0" err="1"/>
-              <a:t>Evaluate</a:t>
-            </a:r>
-            <a:r>
-              <a:rPr lang="nb-NO" dirty="0"/>
-              <a:t> </a:t>
-            </a:r>
-            <a:r>
-              <a:rPr lang="nb-NO" dirty="0" err="1"/>
-              <a:t>what</a:t>
-            </a:r>
-            <a:r>
-              <a:rPr lang="nb-NO" dirty="0"/>
-              <a:t> has </a:t>
-            </a:r>
-            <a:r>
-              <a:rPr lang="nb-NO" dirty="0" err="1"/>
-              <a:t>been</a:t>
-            </a:r>
-            <a:r>
-              <a:rPr lang="nb-NO" dirty="0"/>
-              <a:t> </a:t>
-            </a:r>
-            <a:r>
-              <a:rPr lang="nb-NO" dirty="0" err="1"/>
-              <a:t>good</a:t>
-            </a:r>
-            <a:r>
-              <a:rPr lang="nb-NO" dirty="0"/>
-              <a:t>/bad/</a:t>
-            </a:r>
-            <a:r>
-              <a:rPr lang="nb-NO" dirty="0" err="1"/>
-              <a:t>quick</a:t>
-            </a:r>
-            <a:r>
-              <a:rPr lang="nb-NO" dirty="0"/>
-              <a:t>/</a:t>
-            </a:r>
-            <a:r>
-              <a:rPr lang="nb-NO" dirty="0" err="1"/>
-              <a:t>slow</a:t>
-            </a:r>
-            <a:endParaRPr lang="nb-NO" dirty="0"/>
-          </a:p>
-          <a:p>
-            <a:r>
-              <a:rPr lang="nb-NO" dirty="0"/>
-              <a:t>The </a:t>
-            </a:r>
-            <a:r>
-              <a:rPr lang="nb-NO" dirty="0" err="1"/>
-              <a:t>way</a:t>
-            </a:r>
-            <a:r>
-              <a:rPr lang="nb-NO" dirty="0"/>
-              <a:t> forward</a:t>
-            </a:r>
-            <a:endParaRPr lang="en-GB" dirty="0"/>
-          </a:p>
-        </p:txBody>
-      </p:sp>
-    </p:spTree>
-    <p:extLst>
-      <p:ext uri="{BB962C8B-B14F-4D97-AF65-F5344CB8AC3E}">
-        <p14:creationId xmlns:p14="http://schemas.microsoft.com/office/powerpoint/2010/main" val="414887729"/>
-      </p:ext>
-    </p:extLst>
-  </p:cSld>
-  <p:clrMapOvr>
-    <a:masterClrMapping/>
-  </p:clrMapOvr>
-</p:sld>
-</file>
-
-<file path=ppt/slides/slide4.xml><?xml version="1.0" encoding="utf-8"?>
-<p:sld xmlns:a="http://schemas.openxmlformats.org/drawingml/2006/main" xmlns:r="http://schemas.openxmlformats.org/officeDocument/2006/relationships" xmlns:p="http://schemas.openxmlformats.org/presentationml/2006/main">
-  <p:cSld>
-    <p:spTree>
-      <p:nvGrpSpPr>
-        <p:cNvPr id="1" name=""/>
-        <p:cNvGrpSpPr/>
-        <p:nvPr/>
-      </p:nvGrpSpPr>
-      <p:grpSpPr>
-        <a:xfrm>
-          <a:off x="0" y="0"/>
-          <a:ext cx="0" cy="0"/>
-          <a:chOff x="0" y="0"/>
-          <a:chExt cx="0" cy="0"/>
-        </a:xfrm>
-      </p:grpSpPr>
-      <p:sp>
-        <p:nvSpPr>
-          <p:cNvPr id="2" name="Title 1">
-            <a:extLst>
-              <a:ext uri="{FF2B5EF4-FFF2-40B4-BE49-F238E27FC236}">
                 <a16:creationId xmlns:a16="http://schemas.microsoft.com/office/drawing/2014/main" id="{36DD8560-AAB8-4A6C-A686-7A90CCF512F3}"/>
               </a:ext>
             </a:extLst>
@@ -6823,7 +6228,7 @@
 </p:sld>
 </file>
 
-<file path=ppt/slides/slide5.xml><?xml version="1.0" encoding="utf-8"?>
+<file path=ppt/slides/slide4.xml><?xml version="1.0" encoding="utf-8"?>
 <p:sld xmlns:a="http://schemas.openxmlformats.org/drawingml/2006/main" xmlns:r="http://schemas.openxmlformats.org/officeDocument/2006/relationships" xmlns:p="http://schemas.openxmlformats.org/presentationml/2006/main">
   <p:cSld>
     <p:spTree>
@@ -7189,7 +6594,7 @@
 </p:sld>
 </file>
 
-<file path=ppt/slides/slide6.xml><?xml version="1.0" encoding="utf-8"?>
+<file path=ppt/slides/slide5.xml><?xml version="1.0" encoding="utf-8"?>
 <p:sld xmlns:a="http://schemas.openxmlformats.org/drawingml/2006/main" xmlns:r="http://schemas.openxmlformats.org/officeDocument/2006/relationships" xmlns:p="http://schemas.openxmlformats.org/presentationml/2006/main">
   <p:cSld>
     <p:spTree>
@@ -7896,7 +7301,7 @@
 </p:sld>
 </file>
 
-<file path=ppt/slides/slide7.xml><?xml version="1.0" encoding="utf-8"?>
+<file path=ppt/slides/slide6.xml><?xml version="1.0" encoding="utf-8"?>
 <p:sld xmlns:a="http://schemas.openxmlformats.org/drawingml/2006/main" xmlns:r="http://schemas.openxmlformats.org/officeDocument/2006/relationships" xmlns:p="http://schemas.openxmlformats.org/presentationml/2006/main">
   <p:cSld>
     <p:spTree>
@@ -8038,7 +7443,7 @@
 </p:sld>
 </file>
 
-<file path=ppt/slides/slide8.xml><?xml version="1.0" encoding="utf-8"?>
+<file path=ppt/slides/slide7.xml><?xml version="1.0" encoding="utf-8"?>
 <p:sld xmlns:a="http://schemas.openxmlformats.org/drawingml/2006/main" xmlns:r="http://schemas.openxmlformats.org/officeDocument/2006/relationships" xmlns:p="http://schemas.openxmlformats.org/presentationml/2006/main">
   <p:cSld>
     <p:spTree>
@@ -8392,6 +7797,466 @@
 </p:sld>
 </file>
 
+<file path=ppt/slides/slide8.xml><?xml version="1.0" encoding="utf-8"?>
+<p:sld xmlns:a="http://schemas.openxmlformats.org/drawingml/2006/main" xmlns:r="http://schemas.openxmlformats.org/officeDocument/2006/relationships" xmlns:p="http://schemas.openxmlformats.org/presentationml/2006/main">
+  <p:cSld>
+    <p:spTree>
+      <p:nvGrpSpPr>
+        <p:cNvPr id="1" name=""/>
+        <p:cNvGrpSpPr/>
+        <p:nvPr/>
+      </p:nvGrpSpPr>
+      <p:grpSpPr>
+        <a:xfrm>
+          <a:off x="0" y="0"/>
+          <a:ext cx="0" cy="0"/>
+          <a:chOff x="0" y="0"/>
+          <a:chExt cx="0" cy="0"/>
+        </a:xfrm>
+      </p:grpSpPr>
+      <p:sp>
+        <p:nvSpPr>
+          <p:cNvPr id="2" name="Title 1">
+            <a:extLst>
+              <a:ext uri="{FF2B5EF4-FFF2-40B4-BE49-F238E27FC236}">
+                <a16:creationId xmlns:a16="http://schemas.microsoft.com/office/drawing/2014/main" id="{E4427D13-DB43-4980-981F-0A0FA44DD3FD}"/>
+              </a:ext>
+            </a:extLst>
+          </p:cNvPr>
+          <p:cNvSpPr>
+            <a:spLocks noGrp="1"/>
+          </p:cNvSpPr>
+          <p:nvPr>
+            <p:ph type="title"/>
+          </p:nvPr>
+        </p:nvSpPr>
+        <p:spPr/>
+        <p:txBody>
+          <a:bodyPr/>
+          <a:lstStyle/>
+          <a:p>
+            <a:r>
+              <a:rPr lang="nb-NO" dirty="0" err="1"/>
+              <a:t>Going</a:t>
+            </a:r>
+            <a:r>
+              <a:rPr lang="nb-NO" dirty="0"/>
+              <a:t> forward</a:t>
+            </a:r>
+            <a:endParaRPr lang="en-GB" dirty="0"/>
+          </a:p>
+        </p:txBody>
+      </p:sp>
+      <p:sp>
+        <p:nvSpPr>
+          <p:cNvPr id="3" name="Content Placeholder 2">
+            <a:extLst>
+              <a:ext uri="{FF2B5EF4-FFF2-40B4-BE49-F238E27FC236}">
+                <a16:creationId xmlns:a16="http://schemas.microsoft.com/office/drawing/2014/main" id="{16B5A1CA-4451-41C8-BF5E-9EF440CBADFE}"/>
+              </a:ext>
+            </a:extLst>
+          </p:cNvPr>
+          <p:cNvSpPr>
+            <a:spLocks noGrp="1"/>
+          </p:cNvSpPr>
+          <p:nvPr>
+            <p:ph idx="1"/>
+          </p:nvPr>
+        </p:nvSpPr>
+        <p:spPr/>
+        <p:txBody>
+          <a:bodyPr>
+            <a:normAutofit fontScale="92500"/>
+          </a:bodyPr>
+          <a:lstStyle/>
+          <a:p>
+            <a:r>
+              <a:rPr lang="nb-NO" dirty="0" err="1"/>
+              <a:t>Starting</a:t>
+            </a:r>
+            <a:r>
+              <a:rPr lang="nb-NO" dirty="0"/>
+              <a:t> to </a:t>
+            </a:r>
+            <a:r>
+              <a:rPr lang="nb-NO" dirty="0" err="1"/>
+              <a:t>implement</a:t>
+            </a:r>
+            <a:r>
+              <a:rPr lang="nb-NO" dirty="0"/>
+              <a:t> CPT </a:t>
+            </a:r>
+            <a:r>
+              <a:rPr lang="nb-NO" dirty="0" err="1"/>
+              <a:t>prediction</a:t>
+            </a:r>
+            <a:r>
+              <a:rPr lang="nb-NO" dirty="0"/>
+              <a:t> (outputs) and </a:t>
+            </a:r>
+            <a:r>
+              <a:rPr lang="nb-NO" dirty="0" err="1"/>
+              <a:t>seismic</a:t>
+            </a:r>
+            <a:r>
+              <a:rPr lang="nb-NO" dirty="0"/>
+              <a:t> </a:t>
+            </a:r>
+            <a:r>
+              <a:rPr lang="nb-NO" dirty="0" err="1"/>
+              <a:t>attributes</a:t>
+            </a:r>
+            <a:r>
+              <a:rPr lang="nb-NO" dirty="0"/>
+              <a:t> (inputs) to </a:t>
+            </a:r>
+            <a:r>
+              <a:rPr lang="nb-NO" dirty="0" err="1"/>
+              <a:t>the</a:t>
+            </a:r>
+            <a:r>
+              <a:rPr lang="nb-NO" dirty="0"/>
+              <a:t> </a:t>
+            </a:r>
+            <a:r>
+              <a:rPr lang="nb-NO" dirty="0" err="1"/>
+              <a:t>model</a:t>
+            </a:r>
+            <a:r>
+              <a:rPr lang="nb-NO" dirty="0"/>
+              <a:t> runs</a:t>
+            </a:r>
+          </a:p>
+          <a:p>
+            <a:pPr lvl="1"/>
+            <a:r>
+              <a:rPr lang="nb-NO" dirty="0" err="1"/>
+              <a:t>Also</a:t>
+            </a:r>
+            <a:r>
+              <a:rPr lang="nb-NO" dirty="0"/>
+              <a:t> </a:t>
+            </a:r>
+            <a:r>
+              <a:rPr lang="nb-NO" dirty="0" err="1"/>
+              <a:t>implementing</a:t>
+            </a:r>
+            <a:r>
+              <a:rPr lang="nb-NO" dirty="0"/>
+              <a:t> </a:t>
+            </a:r>
+            <a:r>
+              <a:rPr lang="nb-NO" dirty="0" err="1"/>
+              <a:t>robertson</a:t>
+            </a:r>
+            <a:r>
+              <a:rPr lang="nb-NO" dirty="0"/>
+              <a:t> </a:t>
+            </a:r>
+            <a:r>
+              <a:rPr lang="nb-NO" dirty="0" err="1"/>
+              <a:t>classification</a:t>
+            </a:r>
+            <a:r>
+              <a:rPr lang="nb-NO" dirty="0"/>
+              <a:t> </a:t>
+            </a:r>
+            <a:r>
+              <a:rPr lang="nb-NO" dirty="0" err="1"/>
+              <a:t>task</a:t>
+            </a:r>
+            <a:endParaRPr lang="nb-NO" dirty="0"/>
+          </a:p>
+          <a:p>
+            <a:r>
+              <a:rPr lang="nb-NO" dirty="0" err="1"/>
+              <a:t>Tensorboard</a:t>
+            </a:r>
+            <a:r>
+              <a:rPr lang="nb-NO" dirty="0"/>
+              <a:t> image </a:t>
+            </a:r>
+            <a:r>
+              <a:rPr lang="nb-NO" dirty="0" err="1"/>
+              <a:t>visualization</a:t>
+            </a:r>
+            <a:endParaRPr lang="nb-NO" dirty="0"/>
+          </a:p>
+          <a:p>
+            <a:pPr lvl="1"/>
+            <a:r>
+              <a:rPr lang="nb-NO" dirty="0" err="1"/>
+              <a:t>I’m</a:t>
+            </a:r>
+            <a:r>
+              <a:rPr lang="nb-NO" dirty="0"/>
+              <a:t> </a:t>
+            </a:r>
+            <a:r>
+              <a:rPr lang="nb-NO" dirty="0" err="1"/>
+              <a:t>going</a:t>
+            </a:r>
+            <a:r>
+              <a:rPr lang="nb-NO" dirty="0"/>
+              <a:t> to </a:t>
+            </a:r>
+            <a:r>
+              <a:rPr lang="nb-NO" dirty="0" err="1"/>
+              <a:t>select</a:t>
+            </a:r>
+            <a:r>
+              <a:rPr lang="nb-NO" dirty="0"/>
+              <a:t> </a:t>
+            </a:r>
+            <a:r>
+              <a:rPr lang="nb-NO" dirty="0" err="1"/>
+              <a:t>certain</a:t>
+            </a:r>
+            <a:r>
+              <a:rPr lang="nb-NO" dirty="0"/>
+              <a:t> </a:t>
+            </a:r>
+            <a:r>
+              <a:rPr lang="nb-NO" dirty="0" err="1"/>
+              <a:t>features</a:t>
+            </a:r>
+            <a:r>
+              <a:rPr lang="nb-NO" dirty="0"/>
+              <a:t> from </a:t>
+            </a:r>
+            <a:r>
+              <a:rPr lang="nb-NO" dirty="0" err="1"/>
+              <a:t>the</a:t>
+            </a:r>
+            <a:r>
+              <a:rPr lang="nb-NO" dirty="0"/>
+              <a:t> </a:t>
+            </a:r>
+            <a:r>
+              <a:rPr lang="nb-NO" dirty="0" err="1"/>
+              <a:t>dataset</a:t>
+            </a:r>
+            <a:r>
+              <a:rPr lang="nb-NO" dirty="0"/>
+              <a:t>, and </a:t>
+            </a:r>
+            <a:r>
+              <a:rPr lang="nb-NO" dirty="0" err="1"/>
+              <a:t>tensorboard</a:t>
+            </a:r>
+            <a:r>
+              <a:rPr lang="nb-NO" dirty="0"/>
+              <a:t> </a:t>
+            </a:r>
+            <a:r>
+              <a:rPr lang="nb-NO" dirty="0" err="1"/>
+              <a:t>will</a:t>
+            </a:r>
+            <a:r>
+              <a:rPr lang="nb-NO" dirty="0"/>
+              <a:t> show </a:t>
+            </a:r>
+            <a:r>
+              <a:rPr lang="nb-NO" dirty="0" err="1"/>
+              <a:t>how</a:t>
+            </a:r>
+            <a:r>
+              <a:rPr lang="nb-NO" dirty="0"/>
+              <a:t> </a:t>
+            </a:r>
+            <a:r>
+              <a:rPr lang="nb-NO" dirty="0" err="1"/>
+              <a:t>the</a:t>
+            </a:r>
+            <a:r>
+              <a:rPr lang="nb-NO" dirty="0"/>
+              <a:t> </a:t>
+            </a:r>
+            <a:r>
+              <a:rPr lang="nb-NO" dirty="0" err="1"/>
+              <a:t>feature</a:t>
+            </a:r>
+            <a:r>
+              <a:rPr lang="nb-NO" dirty="0"/>
+              <a:t> </a:t>
+            </a:r>
+            <a:r>
+              <a:rPr lang="nb-NO" dirty="0" err="1"/>
+              <a:t>maps</a:t>
+            </a:r>
+            <a:r>
+              <a:rPr lang="nb-NO" dirty="0"/>
+              <a:t> </a:t>
+            </a:r>
+            <a:r>
+              <a:rPr lang="nb-NO" dirty="0" err="1"/>
+              <a:t>look</a:t>
+            </a:r>
+            <a:r>
+              <a:rPr lang="nb-NO" dirty="0"/>
+              <a:t> at </a:t>
+            </a:r>
+            <a:r>
+              <a:rPr lang="nb-NO" dirty="0" err="1"/>
+              <a:t>the</a:t>
+            </a:r>
+            <a:r>
+              <a:rPr lang="nb-NO" dirty="0"/>
+              <a:t> different stages.</a:t>
+            </a:r>
+          </a:p>
+          <a:p>
+            <a:pPr lvl="1"/>
+            <a:r>
+              <a:rPr lang="nb-NO" dirty="0"/>
+              <a:t>The </a:t>
+            </a:r>
+            <a:r>
+              <a:rPr lang="nb-NO" dirty="0" err="1"/>
+              <a:t>features</a:t>
+            </a:r>
+            <a:r>
+              <a:rPr lang="nb-NO" dirty="0"/>
+              <a:t> </a:t>
+            </a:r>
+            <a:r>
+              <a:rPr lang="nb-NO" dirty="0" err="1"/>
+              <a:t>will</a:t>
+            </a:r>
+            <a:r>
+              <a:rPr lang="nb-NO" dirty="0"/>
+              <a:t> </a:t>
+            </a:r>
+            <a:r>
+              <a:rPr lang="nb-NO" dirty="0" err="1"/>
+              <a:t>get</a:t>
+            </a:r>
+            <a:r>
+              <a:rPr lang="nb-NO" dirty="0"/>
+              <a:t> </a:t>
+            </a:r>
+            <a:r>
+              <a:rPr lang="nb-NO" dirty="0" err="1"/>
+              <a:t>selected</a:t>
+            </a:r>
+            <a:r>
+              <a:rPr lang="nb-NO" dirty="0"/>
+              <a:t> </a:t>
+            </a:r>
+            <a:r>
+              <a:rPr lang="nb-NO" dirty="0" err="1"/>
+              <a:t>based</a:t>
+            </a:r>
+            <a:r>
+              <a:rPr lang="nb-NO" dirty="0"/>
+              <a:t> </a:t>
+            </a:r>
+            <a:r>
+              <a:rPr lang="nb-NO" dirty="0" err="1"/>
+              <a:t>on</a:t>
+            </a:r>
+            <a:r>
+              <a:rPr lang="nb-NO" dirty="0"/>
+              <a:t> </a:t>
+            </a:r>
+            <a:r>
+              <a:rPr lang="nb-NO" dirty="0" err="1"/>
+              <a:t>geological</a:t>
+            </a:r>
+            <a:r>
+              <a:rPr lang="nb-NO" dirty="0"/>
+              <a:t> </a:t>
+            </a:r>
+            <a:r>
+              <a:rPr lang="nb-NO" dirty="0" err="1"/>
+              <a:t>facies</a:t>
+            </a:r>
+            <a:r>
+              <a:rPr lang="nb-NO" dirty="0"/>
+              <a:t>.</a:t>
+            </a:r>
+          </a:p>
+          <a:p>
+            <a:r>
+              <a:rPr lang="nb-NO" dirty="0"/>
+              <a:t>Matching CPT to </a:t>
+            </a:r>
+            <a:r>
+              <a:rPr lang="nb-NO" dirty="0" err="1"/>
+              <a:t>seismic</a:t>
+            </a:r>
+            <a:r>
+              <a:rPr lang="nb-NO" dirty="0"/>
+              <a:t> and </a:t>
+            </a:r>
+            <a:r>
+              <a:rPr lang="nb-NO" dirty="0" err="1"/>
+              <a:t>writing</a:t>
+            </a:r>
+            <a:r>
+              <a:rPr lang="nb-NO" dirty="0"/>
+              <a:t> </a:t>
+            </a:r>
+            <a:r>
+              <a:rPr lang="nb-NO" dirty="0" err="1"/>
+              <a:t>funciton</a:t>
+            </a:r>
+            <a:r>
+              <a:rPr lang="nb-NO" dirty="0"/>
+              <a:t> for </a:t>
+            </a:r>
+            <a:r>
+              <a:rPr lang="nb-NO" dirty="0" err="1"/>
+              <a:t>extracting</a:t>
+            </a:r>
+            <a:r>
+              <a:rPr lang="nb-NO" dirty="0"/>
+              <a:t> </a:t>
+            </a:r>
+            <a:r>
+              <a:rPr lang="nb-NO" dirty="0" err="1"/>
+              <a:t>seismic</a:t>
+            </a:r>
+            <a:r>
+              <a:rPr lang="nb-NO" dirty="0"/>
+              <a:t> data </a:t>
+            </a:r>
+            <a:r>
+              <a:rPr lang="nb-NO" dirty="0" err="1"/>
+              <a:t>near</a:t>
+            </a:r>
+            <a:r>
+              <a:rPr lang="nb-NO" dirty="0"/>
+              <a:t> a </a:t>
+            </a:r>
+            <a:r>
+              <a:rPr lang="nb-NO" dirty="0" err="1"/>
+              <a:t>borehole</a:t>
+            </a:r>
+            <a:endParaRPr lang="nb-NO" dirty="0"/>
+          </a:p>
+          <a:p>
+            <a:r>
+              <a:rPr lang="nb-NO" dirty="0"/>
+              <a:t>WRITING!</a:t>
+            </a:r>
+            <a:endParaRPr lang="en-GB" dirty="0"/>
+          </a:p>
+        </p:txBody>
+      </p:sp>
+    </p:spTree>
+    <p:extLst>
+      <p:ext uri="{BB962C8B-B14F-4D97-AF65-F5344CB8AC3E}">
+        <p14:creationId xmlns:p14="http://schemas.microsoft.com/office/powerpoint/2010/main" val="4014803576"/>
+      </p:ext>
+    </p:extLst>
+  </p:cSld>
+  <p:clrMapOvr>
+    <a:masterClrMapping/>
+  </p:clrMapOvr>
+</p:sld>
+</file>
+
 <file path=ppt/slides/slide9.xml><?xml version="1.0" encoding="utf-8"?>
 <p:sld xmlns:a="http://schemas.openxmlformats.org/drawingml/2006/main" xmlns:r="http://schemas.openxmlformats.org/officeDocument/2006/relationships" xmlns:p="http://schemas.openxmlformats.org/presentationml/2006/main">
   <p:cSld>
@@ -8414,7 +8279,7 @@
           <p:cNvPr id="2" name="Title 1">
             <a:extLst>
               <a:ext uri="{FF2B5EF4-FFF2-40B4-BE49-F238E27FC236}">
-                <a16:creationId xmlns:a16="http://schemas.microsoft.com/office/drawing/2014/main" id="{E4427D13-DB43-4980-981F-0A0FA44DD3FD}"/>
+                <a16:creationId xmlns:a16="http://schemas.microsoft.com/office/drawing/2014/main" id="{BDC5ACED-AADE-48D7-AD49-723E07D92B6D}"/>
               </a:ext>
             </a:extLst>
           </p:cNvPr>
@@ -8432,11 +8297,11 @@
           <a:p>
             <a:r>
               <a:rPr lang="nb-NO" dirty="0" err="1"/>
-              <a:t>Going</a:t>
-            </a:r>
-            <a:r>
-              <a:rPr lang="nb-NO" dirty="0"/>
-              <a:t> forward</a:t>
+              <a:t>Updated</a:t>
+            </a:r>
+            <a:r>
+              <a:rPr lang="nb-NO" dirty="0"/>
+              <a:t> Goals</a:t>
             </a:r>
             <a:endParaRPr lang="en-GB" dirty="0"/>
           </a:p>
@@ -8447,7 +8312,7 @@
           <p:cNvPr id="3" name="Content Placeholder 2">
             <a:extLst>
               <a:ext uri="{FF2B5EF4-FFF2-40B4-BE49-F238E27FC236}">
-                <a16:creationId xmlns:a16="http://schemas.microsoft.com/office/drawing/2014/main" id="{16B5A1CA-4451-41C8-BF5E-9EF440CBADFE}"/>
+                <a16:creationId xmlns:a16="http://schemas.microsoft.com/office/drawing/2014/main" id="{DC5C0603-7892-4960-BE27-F8C9F40E8AD2}"/>
               </a:ext>
             </a:extLst>
           </p:cNvPr>
@@ -8461,21 +8326,61 @@
         <p:spPr/>
         <p:txBody>
           <a:bodyPr>
-            <a:normAutofit fontScale="92500"/>
+            <a:normAutofit fontScale="85000" lnSpcReduction="20000"/>
           </a:bodyPr>
           <a:lstStyle/>
           <a:p>
             <a:r>
               <a:rPr lang="nb-NO" dirty="0" err="1"/>
-              <a:t>Starting</a:t>
-            </a:r>
-            <a:r>
-              <a:rPr lang="nb-NO" dirty="0"/>
-              <a:t> to </a:t>
-            </a:r>
-            <a:r>
-              <a:rPr lang="nb-NO" dirty="0" err="1"/>
-              <a:t>implement</a:t>
+              <a:t>Compare</a:t>
+            </a:r>
+            <a:r>
+              <a:rPr lang="nb-NO" dirty="0"/>
+              <a:t> </a:t>
+            </a:r>
+            <a:r>
+              <a:rPr lang="nb-NO" dirty="0" err="1"/>
+              <a:t>prediction</a:t>
+            </a:r>
+            <a:r>
+              <a:rPr lang="nb-NO" dirty="0"/>
+              <a:t> </a:t>
+            </a:r>
+            <a:r>
+              <a:rPr lang="nb-NO" dirty="0" err="1"/>
+              <a:t>results</a:t>
+            </a:r>
+            <a:r>
+              <a:rPr lang="nb-NO" dirty="0"/>
+              <a:t> </a:t>
+            </a:r>
+            <a:r>
+              <a:rPr lang="nb-NO" dirty="0" err="1"/>
+              <a:t>of</a:t>
+            </a:r>
+            <a:r>
+              <a:rPr lang="nb-NO" dirty="0"/>
+              <a:t> </a:t>
+            </a:r>
+            <a:r>
+              <a:rPr lang="nb-NO" dirty="0" err="1"/>
+              <a:t>following</a:t>
+            </a:r>
+            <a:r>
+              <a:rPr lang="nb-NO" dirty="0"/>
+              <a:t> </a:t>
+            </a:r>
+            <a:r>
+              <a:rPr lang="nb-NO" dirty="0" err="1"/>
+              <a:t>approaches</a:t>
+            </a:r>
+            <a:r>
+              <a:rPr lang="nb-NO" dirty="0"/>
+              <a:t>, all </a:t>
+            </a:r>
+            <a:r>
+              <a:rPr lang="nb-NO" dirty="0" err="1"/>
+              <a:t>predicting</a:t>
             </a:r>
             <a:r>
               <a:rPr lang="nb-NO" dirty="0"/>
@@ -8483,11 +8388,78 @@
             </a:r>
             <a:r>
               <a:rPr lang="nb-NO" dirty="0" err="1"/>
-              <a:t>prediction</a:t>
-            </a:r>
-            <a:r>
-              <a:rPr lang="nb-NO" dirty="0"/>
-              <a:t> (outputs) and </a:t>
+              <a:t>also</a:t>
+            </a:r>
+            <a:r>
+              <a:rPr lang="nb-NO" dirty="0"/>
+              <a:t>:</a:t>
+            </a:r>
+          </a:p>
+          <a:p>
+            <a:pPr lvl="1"/>
+            <a:r>
+              <a:rPr lang="nb-NO" dirty="0"/>
+              <a:t>1D TCN </a:t>
+            </a:r>
+            <a:r>
+              <a:rPr lang="nb-NO" dirty="0" err="1"/>
+              <a:t>with</a:t>
+            </a:r>
+            <a:r>
+              <a:rPr lang="nb-NO" dirty="0"/>
+              <a:t> </a:t>
+            </a:r>
+            <a:r>
+              <a:rPr lang="nb-NO" dirty="0" err="1"/>
+              <a:t>regression</a:t>
+            </a:r>
+            <a:r>
+              <a:rPr lang="nb-NO" dirty="0"/>
+              <a:t> &amp; </a:t>
+            </a:r>
+            <a:r>
+              <a:rPr lang="nb-NO" dirty="0" err="1"/>
+              <a:t>reconstruction</a:t>
+            </a:r>
+            <a:endParaRPr lang="nb-NO" dirty="0"/>
+          </a:p>
+          <a:p>
+            <a:pPr lvl="1"/>
+            <a:r>
+              <a:rPr lang="nb-NO" dirty="0"/>
+              <a:t>1D TCN </a:t>
+            </a:r>
+            <a:r>
+              <a:rPr lang="nb-NO" dirty="0" err="1"/>
+              <a:t>with</a:t>
+            </a:r>
+            <a:r>
+              <a:rPr lang="nb-NO" dirty="0"/>
+              <a:t> </a:t>
+            </a:r>
+            <a:r>
+              <a:rPr lang="nb-NO" dirty="0" err="1"/>
+              <a:t>regression</a:t>
+            </a:r>
+            <a:r>
+              <a:rPr lang="nb-NO" dirty="0"/>
+              <a:t> &amp; </a:t>
+            </a:r>
+            <a:r>
+              <a:rPr lang="nb-NO" dirty="0" err="1"/>
+              <a:t>reconstruciton</a:t>
+            </a:r>
+            <a:r>
+              <a:rPr lang="nb-NO" dirty="0"/>
+              <a:t> </a:t>
+            </a:r>
+            <a:r>
+              <a:rPr lang="nb-NO" dirty="0" err="1"/>
+              <a:t>using</a:t>
+            </a:r>
+            <a:r>
+              <a:rPr lang="nb-NO" dirty="0"/>
+              <a:t> spatial info from </a:t>
             </a:r>
             <a:r>
               <a:rPr lang="nb-NO" dirty="0" err="1"/>
@@ -8501,13 +8473,17 @@
               <a:rPr lang="nb-NO" dirty="0" err="1"/>
               <a:t>attributes</a:t>
             </a:r>
-            <a:r>
-              <a:rPr lang="nb-NO" dirty="0"/>
-              <a:t> (inputs) to </a:t>
-            </a:r>
-            <a:r>
-              <a:rPr lang="nb-NO" dirty="0" err="1"/>
-              <a:t>the</a:t>
+            <a:endParaRPr lang="nb-NO" dirty="0"/>
+          </a:p>
+          <a:p>
+            <a:pPr lvl="1"/>
+            <a:r>
+              <a:rPr lang="nb-NO" dirty="0"/>
+              <a:t>2D TCN </a:t>
+            </a:r>
+            <a:r>
+              <a:rPr lang="nb-NO" dirty="0" err="1"/>
+              <a:t>with</a:t>
             </a:r>
             <a:r>
               <a:rPr lang="nb-NO" dirty="0"/>
@@ -8515,18 +8491,122 @@
             </a:r>
             <a:r>
               <a:rPr lang="nb-NO" dirty="0" err="1"/>
-              <a:t>model</a:t>
-            </a:r>
-            <a:r>
-              <a:rPr lang="nb-NO" dirty="0"/>
-              <a:t> runs</a:t>
-            </a:r>
+              <a:t>regression</a:t>
+            </a:r>
+            <a:r>
+              <a:rPr lang="nb-NO" dirty="0"/>
+              <a:t> &amp; </a:t>
+            </a:r>
+            <a:r>
+              <a:rPr lang="nb-NO" dirty="0" err="1"/>
+              <a:t>reconstruction</a:t>
+            </a:r>
+            <a:endParaRPr lang="nb-NO" dirty="0"/>
           </a:p>
           <a:p>
             <a:pPr lvl="1"/>
             <a:r>
-              <a:rPr lang="nb-NO" dirty="0" err="1"/>
-              <a:t>Also</a:t>
+              <a:rPr lang="nb-NO" i="1" dirty="0">
+                <a:solidFill>
+                  <a:schemeClr val="tx1">
+                    <a:lumMod val="85000"/>
+                  </a:schemeClr>
+                </a:solidFill>
+              </a:rPr>
+              <a:t>1D TCN </a:t>
+            </a:r>
+            <a:r>
+              <a:rPr lang="nb-NO" i="1" dirty="0" err="1">
+                <a:solidFill>
+                  <a:schemeClr val="tx1">
+                    <a:lumMod val="85000"/>
+                  </a:schemeClr>
+                </a:solidFill>
+              </a:rPr>
+              <a:t>with</a:t>
+            </a:r>
+            <a:r>
+              <a:rPr lang="nb-NO" i="1" dirty="0">
+                <a:solidFill>
+                  <a:schemeClr val="tx1">
+                    <a:lumMod val="85000"/>
+                  </a:schemeClr>
+                </a:solidFill>
+              </a:rPr>
+              <a:t> Robertson </a:t>
+            </a:r>
+            <a:r>
+              <a:rPr lang="nb-NO" i="1" dirty="0" err="1">
+                <a:solidFill>
+                  <a:schemeClr val="tx1">
+                    <a:lumMod val="85000"/>
+                  </a:schemeClr>
+                </a:solidFill>
+              </a:rPr>
+              <a:t>classifyer</a:t>
+            </a:r>
+            <a:endParaRPr lang="nb-NO" i="1" dirty="0">
+              <a:solidFill>
+                <a:schemeClr val="tx1">
+                  <a:lumMod val="85000"/>
+                </a:schemeClr>
+              </a:solidFill>
+            </a:endParaRPr>
+          </a:p>
+          <a:p>
+            <a:pPr lvl="1"/>
+            <a:r>
+              <a:rPr lang="nb-NO" i="1" dirty="0">
+                <a:solidFill>
+                  <a:schemeClr val="tx1">
+                    <a:lumMod val="85000"/>
+                  </a:schemeClr>
+                </a:solidFill>
+              </a:rPr>
+              <a:t>2D TCN </a:t>
+            </a:r>
+            <a:r>
+              <a:rPr lang="nb-NO" i="1" dirty="0" err="1">
+                <a:solidFill>
+                  <a:schemeClr val="tx1">
+                    <a:lumMod val="85000"/>
+                  </a:schemeClr>
+                </a:solidFill>
+              </a:rPr>
+              <a:t>with</a:t>
+            </a:r>
+            <a:r>
+              <a:rPr lang="nb-NO" i="1" dirty="0">
+                <a:solidFill>
+                  <a:schemeClr val="tx1">
+                    <a:lumMod val="85000"/>
+                  </a:schemeClr>
+                </a:solidFill>
+              </a:rPr>
+              <a:t> Robertson </a:t>
+            </a:r>
+            <a:r>
+              <a:rPr lang="nb-NO" i="1" dirty="0" err="1">
+                <a:solidFill>
+                  <a:schemeClr val="tx1">
+                    <a:lumMod val="85000"/>
+                  </a:schemeClr>
+                </a:solidFill>
+              </a:rPr>
+              <a:t>classifyer</a:t>
+            </a:r>
+            <a:endParaRPr lang="nb-NO" i="1" dirty="0">
+              <a:solidFill>
+                <a:schemeClr val="tx1">
+                  <a:lumMod val="85000"/>
+                </a:schemeClr>
+              </a:solidFill>
+            </a:endParaRPr>
+          </a:p>
+          <a:p>
+            <a:r>
+              <a:rPr lang="nb-NO" dirty="0" err="1"/>
+              <a:t>Comparisons</a:t>
             </a:r>
             <a:r>
               <a:rPr lang="nb-NO" dirty="0"/>
@@ -8534,7 +8614,15 @@
             </a:r>
             <a:r>
               <a:rPr lang="nb-NO" dirty="0" err="1"/>
-              <a:t>implementing</a:t>
+              <a:t>will</a:t>
+            </a:r>
+            <a:r>
+              <a:rPr lang="nb-NO" dirty="0"/>
+              <a:t> be done </a:t>
+            </a:r>
+            <a:r>
+              <a:rPr lang="nb-NO" dirty="0" err="1"/>
+              <a:t>based</a:t>
             </a:r>
             <a:r>
               <a:rPr lang="nb-NO" dirty="0"/>
@@ -8542,307 +8630,46 @@
             </a:r>
             <a:r>
               <a:rPr lang="nb-NO" dirty="0" err="1"/>
-              <a:t>robertson</a:t>
-            </a:r>
-            <a:r>
-              <a:rPr lang="nb-NO" dirty="0"/>
-              <a:t> </a:t>
-            </a:r>
-            <a:r>
-              <a:rPr lang="nb-NO" dirty="0" err="1"/>
-              <a:t>classification</a:t>
-            </a:r>
-            <a:r>
-              <a:rPr lang="nb-NO" dirty="0"/>
-              <a:t> </a:t>
-            </a:r>
-            <a:r>
-              <a:rPr lang="nb-NO" dirty="0" err="1"/>
-              <a:t>task</a:t>
-            </a:r>
-            <a:endParaRPr lang="nb-NO" dirty="0"/>
-          </a:p>
-          <a:p>
-            <a:r>
-              <a:rPr lang="nb-NO" dirty="0" err="1"/>
-              <a:t>Tensorboard</a:t>
-            </a:r>
-            <a:r>
-              <a:rPr lang="nb-NO" dirty="0"/>
-              <a:t> image </a:t>
-            </a:r>
-            <a:r>
-              <a:rPr lang="nb-NO" dirty="0" err="1"/>
-              <a:t>visualization</a:t>
-            </a:r>
-            <a:endParaRPr lang="nb-NO" dirty="0"/>
+              <a:t>on</a:t>
+            </a:r>
+            <a:r>
+              <a:rPr lang="nb-NO" dirty="0"/>
+              <a:t>:</a:t>
+            </a:r>
           </a:p>
           <a:p>
             <a:pPr lvl="1"/>
             <a:r>
-              <a:rPr lang="nb-NO" dirty="0" err="1"/>
-              <a:t>I’m</a:t>
-            </a:r>
-            <a:r>
-              <a:rPr lang="nb-NO" dirty="0"/>
-              <a:t> </a:t>
-            </a:r>
-            <a:r>
-              <a:rPr lang="nb-NO" dirty="0" err="1"/>
-              <a:t>going</a:t>
-            </a:r>
-            <a:r>
-              <a:rPr lang="nb-NO" dirty="0"/>
-              <a:t> to </a:t>
-            </a:r>
-            <a:r>
-              <a:rPr lang="nb-NO" dirty="0" err="1"/>
-              <a:t>select</a:t>
-            </a:r>
-            <a:r>
-              <a:rPr lang="nb-NO" dirty="0"/>
-              <a:t> </a:t>
-            </a:r>
-            <a:r>
-              <a:rPr lang="nb-NO" dirty="0" err="1"/>
-              <a:t>certain</a:t>
-            </a:r>
-            <a:r>
-              <a:rPr lang="nb-NO" dirty="0"/>
-              <a:t> </a:t>
-            </a:r>
-            <a:r>
-              <a:rPr lang="nb-NO" dirty="0" err="1"/>
-              <a:t>features</a:t>
-            </a:r>
-            <a:r>
-              <a:rPr lang="nb-NO" dirty="0"/>
-              <a:t> from </a:t>
-            </a:r>
-            <a:r>
-              <a:rPr lang="nb-NO" dirty="0" err="1"/>
-              <a:t>the</a:t>
-            </a:r>
-            <a:r>
-              <a:rPr lang="nb-NO" dirty="0"/>
-              <a:t> </a:t>
-            </a:r>
-            <a:r>
-              <a:rPr lang="nb-NO" dirty="0" err="1"/>
-              <a:t>dataset</a:t>
-            </a:r>
-            <a:r>
-              <a:rPr lang="nb-NO" dirty="0"/>
-              <a:t>, and </a:t>
-            </a:r>
-            <a:r>
-              <a:rPr lang="nb-NO" dirty="0" err="1"/>
-              <a:t>tensorboard</a:t>
-            </a:r>
-            <a:r>
-              <a:rPr lang="nb-NO" dirty="0"/>
-              <a:t> </a:t>
-            </a:r>
-            <a:r>
-              <a:rPr lang="nb-NO" dirty="0" err="1"/>
-              <a:t>will</a:t>
-            </a:r>
-            <a:r>
-              <a:rPr lang="nb-NO" dirty="0"/>
-              <a:t> show </a:t>
-            </a:r>
-            <a:r>
-              <a:rPr lang="nb-NO" dirty="0" err="1"/>
-              <a:t>how</a:t>
-            </a:r>
-            <a:r>
-              <a:rPr lang="nb-NO" dirty="0"/>
-              <a:t> </a:t>
-            </a:r>
-            <a:r>
-              <a:rPr lang="nb-NO" dirty="0" err="1"/>
-              <a:t>the</a:t>
-            </a:r>
-            <a:r>
-              <a:rPr lang="nb-NO" dirty="0"/>
-              <a:t> </a:t>
-            </a:r>
-            <a:r>
-              <a:rPr lang="nb-NO" dirty="0" err="1"/>
-              <a:t>feature</a:t>
-            </a:r>
-            <a:r>
-              <a:rPr lang="nb-NO" dirty="0"/>
-              <a:t> </a:t>
-            </a:r>
-            <a:r>
-              <a:rPr lang="nb-NO" dirty="0" err="1"/>
-              <a:t>maps</a:t>
-            </a:r>
-            <a:r>
-              <a:rPr lang="nb-NO" dirty="0"/>
-              <a:t> </a:t>
-            </a:r>
-            <a:r>
-              <a:rPr lang="nb-NO" dirty="0" err="1"/>
-              <a:t>look</a:t>
-            </a:r>
-            <a:r>
-              <a:rPr lang="nb-NO" dirty="0"/>
-              <a:t> at </a:t>
-            </a:r>
-            <a:r>
-              <a:rPr lang="nb-NO" dirty="0" err="1"/>
-              <a:t>the</a:t>
-            </a:r>
-            <a:r>
-              <a:rPr lang="nb-NO" dirty="0"/>
-              <a:t> different stages.</a:t>
+              <a:rPr lang="en-GB" dirty="0"/>
+              <a:t>Model performance accuracy and loss</a:t>
             </a:r>
           </a:p>
           <a:p>
             <a:pPr lvl="1"/>
             <a:r>
-              <a:rPr lang="nb-NO" dirty="0"/>
-              <a:t>The </a:t>
-            </a:r>
-            <a:r>
-              <a:rPr lang="nb-NO" dirty="0" err="1"/>
-              <a:t>features</a:t>
-            </a:r>
-            <a:r>
-              <a:rPr lang="nb-NO" dirty="0"/>
-              <a:t> </a:t>
-            </a:r>
-            <a:r>
-              <a:rPr lang="nb-NO" dirty="0" err="1"/>
-              <a:t>will</a:t>
-            </a:r>
-            <a:r>
-              <a:rPr lang="nb-NO" dirty="0"/>
-              <a:t> </a:t>
-            </a:r>
-            <a:r>
-              <a:rPr lang="nb-NO" dirty="0" err="1"/>
-              <a:t>get</a:t>
-            </a:r>
-            <a:r>
-              <a:rPr lang="nb-NO" dirty="0"/>
-              <a:t> </a:t>
-            </a:r>
-            <a:r>
-              <a:rPr lang="nb-NO" dirty="0" err="1"/>
-              <a:t>selected</a:t>
-            </a:r>
-            <a:r>
-              <a:rPr lang="nb-NO" dirty="0"/>
-              <a:t> </a:t>
-            </a:r>
-            <a:r>
-              <a:rPr lang="nb-NO" dirty="0" err="1"/>
-              <a:t>based</a:t>
-            </a:r>
-            <a:r>
-              <a:rPr lang="nb-NO" dirty="0"/>
-              <a:t> </a:t>
-            </a:r>
-            <a:r>
-              <a:rPr lang="nb-NO" dirty="0" err="1"/>
-              <a:t>on</a:t>
-            </a:r>
-            <a:r>
-              <a:rPr lang="nb-NO" dirty="0"/>
-              <a:t> </a:t>
-            </a:r>
-            <a:r>
-              <a:rPr lang="nb-NO" dirty="0" err="1"/>
-              <a:t>geological</a:t>
-            </a:r>
-            <a:r>
-              <a:rPr lang="nb-NO" dirty="0"/>
-              <a:t> </a:t>
-            </a:r>
-            <a:r>
-              <a:rPr lang="nb-NO" dirty="0" err="1"/>
-              <a:t>facies</a:t>
-            </a:r>
-            <a:r>
-              <a:rPr lang="nb-NO" dirty="0"/>
-              <a:t>.</a:t>
-            </a:r>
-          </a:p>
-          <a:p>
-            <a:r>
-              <a:rPr lang="nb-NO" dirty="0"/>
-              <a:t>Matching CPT to </a:t>
-            </a:r>
-            <a:r>
-              <a:rPr lang="nb-NO" dirty="0" err="1"/>
-              <a:t>seismic</a:t>
-            </a:r>
-            <a:r>
-              <a:rPr lang="nb-NO" dirty="0"/>
-              <a:t> and </a:t>
-            </a:r>
-            <a:r>
-              <a:rPr lang="nb-NO" dirty="0" err="1"/>
-              <a:t>writing</a:t>
-            </a:r>
-            <a:r>
-              <a:rPr lang="nb-NO" dirty="0"/>
-              <a:t> </a:t>
-            </a:r>
-            <a:r>
-              <a:rPr lang="nb-NO" dirty="0" err="1"/>
-              <a:t>funciton</a:t>
-            </a:r>
-            <a:r>
-              <a:rPr lang="nb-NO" dirty="0"/>
-              <a:t> for </a:t>
-            </a:r>
-            <a:r>
-              <a:rPr lang="nb-NO" dirty="0" err="1"/>
-              <a:t>extracting</a:t>
-            </a:r>
-            <a:r>
-              <a:rPr lang="nb-NO" dirty="0"/>
-              <a:t> </a:t>
-            </a:r>
-            <a:r>
-              <a:rPr lang="nb-NO" dirty="0" err="1"/>
-              <a:t>seismic</a:t>
-            </a:r>
-            <a:r>
-              <a:rPr lang="nb-NO" dirty="0"/>
-              <a:t> data </a:t>
-            </a:r>
-            <a:r>
-              <a:rPr lang="nb-NO" dirty="0" err="1"/>
-              <a:t>near</a:t>
-            </a:r>
-            <a:r>
-              <a:rPr lang="nb-NO" dirty="0"/>
-              <a:t> a </a:t>
-            </a:r>
-            <a:r>
-              <a:rPr lang="nb-NO" dirty="0" err="1"/>
-              <a:t>borehole</a:t>
-            </a:r>
-            <a:endParaRPr lang="nb-NO" dirty="0"/>
-          </a:p>
-          <a:p>
-            <a:r>
-              <a:rPr lang="nb-NO" dirty="0"/>
-              <a:t>WRITING!</a:t>
-            </a:r>
-            <a:endParaRPr lang="en-GB" dirty="0"/>
+              <a:rPr lang="en-GB" dirty="0"/>
+              <a:t>Ability to capture spatial features</a:t>
+            </a:r>
+          </a:p>
+          <a:p>
+            <a:pPr lvl="1"/>
+            <a:r>
+              <a:rPr lang="en-GB" dirty="0"/>
+              <a:t>Quality of predictions within certain features</a:t>
+            </a:r>
+          </a:p>
+          <a:p>
+            <a:r>
+              <a:rPr lang="en-GB" strike="sngStrike" dirty="0"/>
+              <a:t>Do in between seismic lines geostatistical predictions</a:t>
+            </a:r>
           </a:p>
         </p:txBody>
       </p:sp>
     </p:spTree>
     <p:extLst>
       <p:ext uri="{BB962C8B-B14F-4D97-AF65-F5344CB8AC3E}">
-        <p14:creationId xmlns:p14="http://schemas.microsoft.com/office/powerpoint/2010/main" val="4014803576"/>
+        <p14:creationId xmlns:p14="http://schemas.microsoft.com/office/powerpoint/2010/main" val="1676976002"/>
       </p:ext>
     </p:extLst>
   </p:cSld>

</xml_diff>

<commit_message>
adding images that failed to upload
</commit_message>
<xml_diff>
--- a/Meeting Presentations/01.12.2022_General meeting.pptx
+++ b/Meeting Presentations/01.12.2022_General meeting.pptx
@@ -5760,8 +5760,8 @@
           </a:p>
         </p:txBody>
       </p:sp>
-      <mc:AlternateContent xmlns:mc="http://schemas.openxmlformats.org/markup-compatibility/2006" xmlns:a14="http://schemas.microsoft.com/office/drawing/2010/main">
-        <mc:Choice Requires="a14">
+      <mc:AlternateContent xmlns:mc="http://schemas.openxmlformats.org/markup-compatibility/2006">
+        <mc:Choice xmlns:a14="http://schemas.microsoft.com/office/drawing/2010/main" Requires="a14">
           <p:sp>
             <p:nvSpPr>
               <p:cNvPr id="3" name="Content Placeholder 2">
@@ -5861,6 +5861,15 @@
                 <a:pPr marL="0" indent="0">
                   <a:buNone/>
                 </a:pPr>
+                <a:r>
+                  <a:rPr lang="en-GB" dirty="0"/>
+                  <a:t>I will work until 20.12.2022</a:t>
+                </a:r>
+              </a:p>
+              <a:p>
+                <a:pPr marL="0" indent="0">
+                  <a:buNone/>
+                </a:pPr>
                 <a:endParaRPr lang="en-GB" dirty="0"/>
               </a:p>
               <a:p>
@@ -5875,7 +5884,7 @@
             </p:txBody>
           </p:sp>
         </mc:Choice>
-        <mc:Fallback xmlns="">
+        <mc:Fallback>
           <p:sp>
             <p:nvSpPr>
               <p:cNvPr id="3" name="Content Placeholder 2">
@@ -5905,7 +5914,7 @@
               <a:lstStyle/>
               <a:p>
                 <a:r>
-                  <a:rPr lang="en-GB">
+                  <a:rPr lang="nb-NO">
                     <a:noFill/>
                   </a:rPr>
                   <a:t> </a:t>

</xml_diff>